<commit_message>
Subida de 300 imagenes y optimizacipn sustancial de registro diario de alimentos
</commit_message>
<xml_diff>
--- a/0__Memoria/Presentación de trabajo de fin de grado.pptx
+++ b/0__Memoria/Presentación de trabajo de fin de grado.pptx
@@ -843,7 +843,7 @@
           <a:p>
             <a:fld id="{1383D7A4-ACB1-4914-A47A-C638182B0FA3}" type="datetimeFigureOut">
               <a:rPr lang="es-ES" smtClean="0"/>
-              <a:t>30/09/2022</a:t>
+              <a:t>01/10/2022</a:t>
             </a:fld>
             <a:endParaRPr lang="es-ES"/>
           </a:p>
@@ -1094,7 +1094,7 @@
           <a:p>
             <a:fld id="{1383D7A4-ACB1-4914-A47A-C638182B0FA3}" type="datetimeFigureOut">
               <a:rPr lang="es-ES" smtClean="0"/>
-              <a:t>30/09/2022</a:t>
+              <a:t>01/10/2022</a:t>
             </a:fld>
             <a:endParaRPr lang="es-ES"/>
           </a:p>
@@ -1408,7 +1408,7 @@
           <a:p>
             <a:fld id="{1383D7A4-ACB1-4914-A47A-C638182B0FA3}" type="datetimeFigureOut">
               <a:rPr lang="es-ES" smtClean="0"/>
-              <a:t>30/09/2022</a:t>
+              <a:t>01/10/2022</a:t>
             </a:fld>
             <a:endParaRPr lang="es-ES"/>
           </a:p>
@@ -1749,7 +1749,7 @@
           <a:p>
             <a:fld id="{1383D7A4-ACB1-4914-A47A-C638182B0FA3}" type="datetimeFigureOut">
               <a:rPr lang="es-ES" smtClean="0"/>
-              <a:t>30/09/2022</a:t>
+              <a:t>01/10/2022</a:t>
             </a:fld>
             <a:endParaRPr lang="es-ES"/>
           </a:p>
@@ -2063,7 +2063,7 @@
           <a:p>
             <a:fld id="{1383D7A4-ACB1-4914-A47A-C638182B0FA3}" type="datetimeFigureOut">
               <a:rPr lang="es-ES" smtClean="0"/>
-              <a:t>30/09/2022</a:t>
+              <a:t>01/10/2022</a:t>
             </a:fld>
             <a:endParaRPr lang="es-ES"/>
           </a:p>
@@ -2456,7 +2456,7 @@
           <a:p>
             <a:fld id="{1383D7A4-ACB1-4914-A47A-C638182B0FA3}" type="datetimeFigureOut">
               <a:rPr lang="es-ES" smtClean="0"/>
-              <a:t>30/09/2022</a:t>
+              <a:t>01/10/2022</a:t>
             </a:fld>
             <a:endParaRPr lang="es-ES"/>
           </a:p>
@@ -2626,7 +2626,7 @@
           <a:p>
             <a:fld id="{1383D7A4-ACB1-4914-A47A-C638182B0FA3}" type="datetimeFigureOut">
               <a:rPr lang="es-ES" smtClean="0"/>
-              <a:t>30/09/2022</a:t>
+              <a:t>01/10/2022</a:t>
             </a:fld>
             <a:endParaRPr lang="es-ES"/>
           </a:p>
@@ -2806,7 +2806,7 @@
           <a:p>
             <a:fld id="{1383D7A4-ACB1-4914-A47A-C638182B0FA3}" type="datetimeFigureOut">
               <a:rPr lang="es-ES" smtClean="0"/>
-              <a:t>30/09/2022</a:t>
+              <a:t>01/10/2022</a:t>
             </a:fld>
             <a:endParaRPr lang="es-ES"/>
           </a:p>
@@ -2982,7 +2982,7 @@
           <a:p>
             <a:fld id="{1383D7A4-ACB1-4914-A47A-C638182B0FA3}" type="datetimeFigureOut">
               <a:rPr lang="es-ES" smtClean="0"/>
-              <a:t>30/09/2022</a:t>
+              <a:t>01/10/2022</a:t>
             </a:fld>
             <a:endParaRPr lang="es-ES"/>
           </a:p>
@@ -3229,7 +3229,7 @@
           <a:p>
             <a:fld id="{1383D7A4-ACB1-4914-A47A-C638182B0FA3}" type="datetimeFigureOut">
               <a:rPr lang="es-ES" smtClean="0"/>
-              <a:t>30/09/2022</a:t>
+              <a:t>01/10/2022</a:t>
             </a:fld>
             <a:endParaRPr lang="es-ES"/>
           </a:p>
@@ -3461,7 +3461,7 @@
           <a:p>
             <a:fld id="{1383D7A4-ACB1-4914-A47A-C638182B0FA3}" type="datetimeFigureOut">
               <a:rPr lang="es-ES" smtClean="0"/>
-              <a:t>30/09/2022</a:t>
+              <a:t>01/10/2022</a:t>
             </a:fld>
             <a:endParaRPr lang="es-ES"/>
           </a:p>
@@ -3835,7 +3835,7 @@
           <a:p>
             <a:fld id="{1383D7A4-ACB1-4914-A47A-C638182B0FA3}" type="datetimeFigureOut">
               <a:rPr lang="es-ES" smtClean="0"/>
-              <a:t>30/09/2022</a:t>
+              <a:t>01/10/2022</a:t>
             </a:fld>
             <a:endParaRPr lang="es-ES"/>
           </a:p>
@@ -3958,7 +3958,7 @@
           <a:p>
             <a:fld id="{1383D7A4-ACB1-4914-A47A-C638182B0FA3}" type="datetimeFigureOut">
               <a:rPr lang="es-ES" smtClean="0"/>
-              <a:t>30/09/2022</a:t>
+              <a:t>01/10/2022</a:t>
             </a:fld>
             <a:endParaRPr lang="es-ES"/>
           </a:p>
@@ -4053,7 +4053,7 @@
           <a:p>
             <a:fld id="{1383D7A4-ACB1-4914-A47A-C638182B0FA3}" type="datetimeFigureOut">
               <a:rPr lang="es-ES" smtClean="0"/>
-              <a:t>30/09/2022</a:t>
+              <a:t>01/10/2022</a:t>
             </a:fld>
             <a:endParaRPr lang="es-ES"/>
           </a:p>
@@ -4308,7 +4308,7 @@
           <a:p>
             <a:fld id="{1383D7A4-ACB1-4914-A47A-C638182B0FA3}" type="datetimeFigureOut">
               <a:rPr lang="es-ES" smtClean="0"/>
-              <a:t>30/09/2022</a:t>
+              <a:t>01/10/2022</a:t>
             </a:fld>
             <a:endParaRPr lang="es-ES"/>
           </a:p>
@@ -4571,7 +4571,7 @@
           <a:p>
             <a:fld id="{1383D7A4-ACB1-4914-A47A-C638182B0FA3}" type="datetimeFigureOut">
               <a:rPr lang="es-ES" smtClean="0"/>
-              <a:t>30/09/2022</a:t>
+              <a:t>01/10/2022</a:t>
             </a:fld>
             <a:endParaRPr lang="es-ES"/>
           </a:p>
@@ -5314,7 +5314,7 @@
           <a:p>
             <a:fld id="{1383D7A4-ACB1-4914-A47A-C638182B0FA3}" type="datetimeFigureOut">
               <a:rPr lang="es-ES" smtClean="0"/>
-              <a:t>30/09/2022</a:t>
+              <a:t>01/10/2022</a:t>
             </a:fld>
             <a:endParaRPr lang="es-ES"/>
           </a:p>
@@ -6102,7 +6102,7 @@
         </p:spPr>
         <p:txBody>
           <a:bodyPr>
-            <a:normAutofit lnSpcReduction="10000"/>
+            <a:normAutofit/>
           </a:bodyPr>
           <a:lstStyle/>
           <a:p>
@@ -6140,13 +6140,6 @@
             <a:pPr lvl="1"/>
             <a:r>
               <a:rPr lang="es-ES" dirty="0"/>
-              <a:t>Lado del servidor potencialmente explotable en otros sistemas operativos.</a:t>
-            </a:r>
-          </a:p>
-          <a:p>
-            <a:pPr lvl="1"/>
-            <a:r>
-              <a:rPr lang="es-ES" dirty="0"/>
               <a:t>Mobile-</a:t>
             </a:r>
             <a:r>
@@ -6155,23 +6148,13 @@
             </a:r>
             <a:r>
               <a:rPr lang="es-ES" dirty="0"/>
-              <a:t>-</a:t>
+              <a:t> </a:t>
             </a:r>
             <a:r>
               <a:rPr lang="es-ES" dirty="0" err="1"/>
               <a:t>design</a:t>
             </a:r>
-            <a:r>
-              <a:rPr lang="es-ES" dirty="0"/>
-              <a:t>.</a:t>
-            </a:r>
-          </a:p>
-          <a:p>
-            <a:pPr lvl="1"/>
-            <a:r>
-              <a:rPr lang="es-ES" dirty="0"/>
-              <a:t>Extensible, mantenible y fácilmente depurable.</a:t>
-            </a:r>
+            <a:endParaRPr lang="es-ES" dirty="0"/>
           </a:p>
           <a:p>
             <a:r>
@@ -6377,7 +6360,7 @@
             <a:pPr lvl="1"/>
             <a:r>
               <a:rPr lang="es-ES" dirty="0"/>
-              <a:t>Ayudar a las personas a lograr sus objetivos académicos </a:t>
+              <a:t>Ayudar a las personas a lograr sus objetivos nutricional </a:t>
             </a:r>
           </a:p>
           <a:p>
@@ -6479,14 +6462,14 @@
             <p:ph idx="1"/>
             <p:extLst>
               <p:ext uri="{D42A27DB-BD31-4B8C-83A1-F6EECF244321}">
-                <p14:modId xmlns:p14="http://schemas.microsoft.com/office/powerpoint/2010/main" val="2721414208"/>
+                <p14:modId xmlns:p14="http://schemas.microsoft.com/office/powerpoint/2010/main" val="223030268"/>
               </p:ext>
             </p:extLst>
           </p:nvPr>
         </p:nvGraphicFramePr>
         <p:xfrm>
-          <a:off x="499533" y="937490"/>
-          <a:ext cx="10713757" cy="5293109"/>
+          <a:off x="499534" y="1588654"/>
+          <a:ext cx="10713757" cy="3929002"/>
         </p:xfrm>
         <a:graphic>
           <a:graphicData uri="http://schemas.openxmlformats.org/drawingml/2006/table">
@@ -6768,23 +6751,23 @@
                         </a:spcAft>
                       </a:pPr>
                       <a:r>
-                        <a:rPr lang="es-ES" sz="1200">
+                        <a:rPr lang="es-ES" sz="1200" dirty="0">
                           <a:effectLst/>
                         </a:rPr>
                         <a:t>No universalidad del</a:t>
                       </a:r>
                       <a:br>
-                        <a:rPr lang="es-ES" sz="1200">
+                        <a:rPr lang="es-ES" sz="1200" dirty="0">
                           <a:effectLst/>
                         </a:rPr>
                       </a:br>
                       <a:r>
-                        <a:rPr lang="es-ES" sz="1200">
+                        <a:rPr lang="es-ES" sz="1200" dirty="0">
                           <a:effectLst/>
                         </a:rPr>
                         <a:t> servidor</a:t>
                       </a:r>
-                      <a:endParaRPr lang="es-ES" sz="1200">
+                      <a:endParaRPr lang="es-ES" sz="1200" dirty="0">
                         <a:effectLst/>
                         <a:latin typeface="Times New Roman" panose="02020603050405020304" pitchFamily="18" charset="0"/>
                         <a:ea typeface="Times New Roman" panose="02020603050405020304" pitchFamily="18" charset="0"/>
@@ -6839,150 +6822,28 @@
                         </a:spcAft>
                       </a:pPr>
                       <a:r>
-                        <a:rPr lang="es-ES" sz="1200">
+                        <a:rPr lang="es-ES" sz="1200" dirty="0">
                           <a:effectLst/>
                         </a:rPr>
-                        <a:t>Servidor REST que se limite a proveer/recibir indatos en formato JSON delegando más responsabilidad en el lado front-end</a:t>
+                        <a:t>Servidor REST que se limite a proveer/recibir </a:t>
                       </a:r>
-                      <a:endParaRPr lang="es-ES" sz="1200">
-                        <a:effectLst/>
-                        <a:latin typeface="Times New Roman" panose="02020603050405020304" pitchFamily="18" charset="0"/>
-                        <a:ea typeface="Times New Roman" panose="02020603050405020304" pitchFamily="18" charset="0"/>
-                        <a:cs typeface="Times New Roman" panose="02020603050405020304" pitchFamily="18" charset="0"/>
-                      </a:endParaRPr>
-                    </a:p>
-                  </a:txBody>
-                  <a:tcPr marL="40522" marR="40522" marT="0" marB="0"/>
-                </a:tc>
-                <a:extLst>
-                  <a:ext uri="{0D108BD9-81ED-4DB2-BD59-A6C34878D82A}">
-                    <a16:rowId xmlns:a16="http://schemas.microsoft.com/office/drawing/2014/main" val="800252815"/>
-                  </a:ext>
-                </a:extLst>
-              </a:tr>
-              <a:tr h="1161371">
-                <a:tc>
-                  <a:txBody>
-                    <a:bodyPr/>
-                    <a:lstStyle/>
-                    <a:p>
-                      <a:pPr algn="ctr">
-                        <a:lnSpc>
-                          <a:spcPct val="107000"/>
-                        </a:lnSpc>
-                        <a:spcAft>
-                          <a:spcPts val="800"/>
-                        </a:spcAft>
-                      </a:pPr>
                       <a:r>
-                        <a:rPr lang="es-ES" sz="1200">
+                        <a:rPr lang="es-ES" sz="1200" dirty="0" err="1">
                           <a:effectLst/>
                         </a:rPr>
-                        <a:t>Mala implementación de arquitecturas de proyectos software</a:t>
+                        <a:t>indatos</a:t>
                       </a:r>
-                      <a:endParaRPr lang="es-ES" sz="1200">
-                        <a:effectLst/>
-                        <a:latin typeface="Times New Roman" panose="02020603050405020304" pitchFamily="18" charset="0"/>
-                        <a:ea typeface="Times New Roman" panose="02020603050405020304" pitchFamily="18" charset="0"/>
-                        <a:cs typeface="Times New Roman" panose="02020603050405020304" pitchFamily="18" charset="0"/>
-                      </a:endParaRPr>
-                    </a:p>
-                  </a:txBody>
-                  <a:tcPr marL="40522" marR="40522" marT="0" marB="0" anchor="ctr"/>
-                </a:tc>
-                <a:tc>
-                  <a:txBody>
-                    <a:bodyPr/>
-                    <a:lstStyle/>
-                    <a:p>
-                      <a:pPr marL="342900" lvl="0" indent="-342900">
-                        <a:lnSpc>
-                          <a:spcPct val="107000"/>
-                        </a:lnSpc>
-                        <a:spcAft>
-                          <a:spcPts val="800"/>
-                        </a:spcAft>
-                        <a:buFont typeface="Wingdings" panose="05000000000000000000" pitchFamily="2" charset="2"/>
-                        <a:buChar char=""/>
-                      </a:pPr>
                       <a:r>
                         <a:rPr lang="es-ES" sz="1200" dirty="0">
                           <a:effectLst/>
                         </a:rPr>
-                        <a:t>Implementación de arquitecturas sin tener una perspectiva de futuro que permita hacer la aplicación más mantenible, extensible, depurable ..etc..</a:t>
-                      </a:r>
-                      <a:endParaRPr lang="es-ES" sz="1200" dirty="0">
-                        <a:effectLst/>
-                        <a:latin typeface="Times New Roman" panose="02020603050405020304" pitchFamily="18" charset="0"/>
-                        <a:ea typeface="Times New Roman" panose="02020603050405020304" pitchFamily="18" charset="0"/>
-                        <a:cs typeface="Mangal" panose="02040503050203030202" pitchFamily="18" charset="0"/>
-                      </a:endParaRPr>
-                    </a:p>
-                  </a:txBody>
-                  <a:tcPr marL="40522" marR="40522" marT="0" marB="0"/>
-                </a:tc>
-                <a:tc>
-                  <a:txBody>
-                    <a:bodyPr/>
-                    <a:lstStyle/>
-                    <a:p>
-                      <a:pPr>
-                        <a:lnSpc>
-                          <a:spcPct val="107000"/>
-                        </a:lnSpc>
-                        <a:spcAft>
-                          <a:spcPts val="800"/>
-                        </a:spcAft>
-                      </a:pPr>
-                      <a:r>
-                        <a:rPr lang="es-ES" sz="1200" dirty="0">
-                          <a:effectLst/>
-                        </a:rPr>
-                        <a:t>No hacer sobre ingeniería en el lado del servidor implementando un patrón Modelo-controlador.</a:t>
-                      </a:r>
-                    </a:p>
-                    <a:p>
-                      <a:pPr>
-                        <a:lnSpc>
-                          <a:spcPct val="107000"/>
-                        </a:lnSpc>
-                        <a:spcAft>
-                          <a:spcPts val="800"/>
-                        </a:spcAft>
-                      </a:pPr>
-                      <a:r>
-                        <a:rPr lang="es-ES" sz="1200" dirty="0">
-                          <a:effectLst/>
-                        </a:rPr>
-                        <a:t> </a:t>
-                      </a:r>
-                    </a:p>
-                    <a:p>
-                      <a:pPr>
-                        <a:lnSpc>
-                          <a:spcPct val="107000"/>
-                        </a:lnSpc>
-                        <a:spcAft>
-                          <a:spcPts val="800"/>
-                        </a:spcAft>
-                      </a:pPr>
-                      <a:r>
-                        <a:rPr lang="es-ES" sz="1200" dirty="0">
-                          <a:effectLst/>
-                        </a:rPr>
-                        <a:t>Modularizar lado </a:t>
+                        <a:t> en formato JSON delegando más responsabilidad en el lado </a:t>
                       </a:r>
                       <a:r>
                         <a:rPr lang="es-ES" sz="1200" dirty="0" err="1">
                           <a:effectLst/>
                         </a:rPr>
                         <a:t>front-end</a:t>
-                      </a:r>
-                      <a:r>
-                        <a:rPr lang="es-ES" sz="1200" dirty="0">
-                          <a:effectLst/>
-                        </a:rPr>
-                        <a:t> y aplicación del patrón flux</a:t>
                       </a:r>
                       <a:endParaRPr lang="es-ES" sz="1200" dirty="0">
                         <a:effectLst/>
@@ -6996,7 +6857,7 @@
                 </a:tc>
                 <a:extLst>
                   <a:ext uri="{0D108BD9-81ED-4DB2-BD59-A6C34878D82A}">
-                    <a16:rowId xmlns:a16="http://schemas.microsoft.com/office/drawing/2014/main" val="3017791677"/>
+                    <a16:rowId xmlns:a16="http://schemas.microsoft.com/office/drawing/2014/main" val="800252815"/>
                   </a:ext>
                 </a:extLst>
               </a:tr>
@@ -7075,12 +6936,12 @@
                         </a:spcAft>
                       </a:pPr>
                       <a:r>
-                        <a:rPr lang="es-ES" sz="1200">
+                        <a:rPr lang="es-ES" sz="1200" dirty="0">
                           <a:effectLst/>
                         </a:rPr>
                         <a:t>Implementación del patrón FLUX.</a:t>
                       </a:r>
-                      <a:endParaRPr lang="es-ES" sz="1200">
+                      <a:endParaRPr lang="es-ES" sz="1200" dirty="0">
                         <a:effectLst/>
                         <a:latin typeface="Times New Roman" panose="02020603050405020304" pitchFamily="18" charset="0"/>
                         <a:ea typeface="Times New Roman" panose="02020603050405020304" pitchFamily="18" charset="0"/>

</xml_diff>